<commit_message>
Anforderungen und Gewinnung der Datengrundlage
</commit_message>
<xml_diff>
--- a/Seminar/Bachelorseminar_25-04-2023.pptx
+++ b/Seminar/Bachelorseminar_25-04-2023.pptx
@@ -230,7 +230,7 @@
             <a:fld id="{6F1E101A-BD3B-B542-8690-1916D72F307E}" type="datetime1">
               <a:rPr lang="de-DE" smtClean="0"/>
               <a:pPr/>
-              <a:t>04.07.2023</a:t>
+              <a:t>20.07.2023</a:t>
             </a:fld>
             <a:endParaRPr lang="de-DE" dirty="0"/>
           </a:p>
@@ -374,7 +374,7 @@
           <a:p>
             <a:fld id="{8F26348B-845F-9447-ACF0-EB8A1B8AE0E8}" type="datetime1">
               <a:rPr lang="de-DE" smtClean="0"/>
-              <a:t>04.07.2023</a:t>
+              <a:t>20.07.2023</a:t>
             </a:fld>
             <a:endParaRPr lang="de-DE" dirty="0"/>
           </a:p>
@@ -615,7 +615,7 @@
           <a:p>
             <a:fld id="{6F1E101A-BD3B-B542-8690-1916D72F307E}" type="datetime1">
               <a:rPr lang="de-DE" smtClean="0"/>
-              <a:t>04.07.2023</a:t>
+              <a:t>20.07.2023</a:t>
             </a:fld>
             <a:endParaRPr lang="de-DE" dirty="0"/>
           </a:p>
@@ -842,7 +842,7 @@
           <a:p>
             <a:fld id="{6F1E101A-BD3B-B542-8690-1916D72F307E}" type="datetime1">
               <a:rPr lang="de-DE" smtClean="0"/>
-              <a:t>04.07.2023</a:t>
+              <a:t>20.07.2023</a:t>
             </a:fld>
             <a:endParaRPr lang="de-DE" dirty="0"/>
           </a:p>
@@ -1216,7 +1216,7 @@
           <a:p>
             <a:fld id="{6F1E101A-BD3B-B542-8690-1916D72F307E}" type="datetime1">
               <a:rPr lang="de-DE" smtClean="0"/>
-              <a:t>04.07.2023</a:t>
+              <a:t>20.07.2023</a:t>
             </a:fld>
             <a:endParaRPr lang="de-DE" dirty="0"/>
           </a:p>
@@ -1553,7 +1553,7 @@
           <a:p>
             <a:fld id="{6F1E101A-BD3B-B542-8690-1916D72F307E}" type="datetime1">
               <a:rPr lang="de-DE" smtClean="0"/>
-              <a:t>04.07.2023</a:t>
+              <a:t>20.07.2023</a:t>
             </a:fld>
             <a:endParaRPr lang="de-DE" dirty="0"/>
           </a:p>
@@ -1991,7 +1991,7 @@
             <a:fld id="{6F1E101A-BD3B-B542-8690-1916D72F307E}" type="datetime1">
               <a:rPr lang="de-DE" smtClean="0"/>
               <a:pPr/>
-              <a:t>04.07.2023</a:t>
+              <a:t>20.07.2023</a:t>
             </a:fld>
             <a:endParaRPr lang="de-DE" dirty="0"/>
           </a:p>
@@ -2173,7 +2173,7 @@
             <a:fld id="{6F1E101A-BD3B-B542-8690-1916D72F307E}" type="datetime1">
               <a:rPr lang="de-DE" smtClean="0"/>
               <a:pPr/>
-              <a:t>04.07.2023</a:t>
+              <a:t>20.07.2023</a:t>
             </a:fld>
             <a:endParaRPr lang="de-DE" dirty="0"/>
           </a:p>
@@ -2405,7 +2405,7 @@
             <a:fld id="{6F1E101A-BD3B-B542-8690-1916D72F307E}" type="datetime1">
               <a:rPr lang="de-DE" smtClean="0"/>
               <a:pPr/>
-              <a:t>04.07.2023</a:t>
+              <a:t>20.07.2023</a:t>
             </a:fld>
             <a:endParaRPr lang="de-DE" dirty="0"/>
           </a:p>
@@ -2708,7 +2708,7 @@
             <a:fld id="{6F1E101A-BD3B-B542-8690-1916D72F307E}" type="datetime1">
               <a:rPr lang="de-DE" smtClean="0"/>
               <a:pPr/>
-              <a:t>04.07.2023</a:t>
+              <a:t>20.07.2023</a:t>
             </a:fld>
             <a:endParaRPr lang="de-DE" dirty="0"/>
           </a:p>
@@ -3231,7 +3231,7 @@
             <a:fld id="{6F1E101A-BD3B-B542-8690-1916D72F307E}" type="datetime1">
               <a:rPr lang="de-DE" smtClean="0"/>
               <a:pPr/>
-              <a:t>04.07.2023</a:t>
+              <a:t>20.07.2023</a:t>
             </a:fld>
             <a:endParaRPr lang="de-DE" dirty="0"/>
           </a:p>
@@ -3605,7 +3605,7 @@
             <a:fld id="{6F1E101A-BD3B-B542-8690-1916D72F307E}" type="datetime1">
               <a:rPr lang="de-DE" smtClean="0"/>
               <a:pPr/>
-              <a:t>04.07.2023</a:t>
+              <a:t>20.07.2023</a:t>
             </a:fld>
             <a:endParaRPr lang="de-DE" dirty="0"/>
           </a:p>
@@ -3900,7 +3900,7 @@
           <a:p>
             <a:fld id="{6F1E101A-BD3B-B542-8690-1916D72F307E}" type="datetime1">
               <a:rPr lang="de-DE" smtClean="0"/>
-              <a:t>04.07.2023</a:t>
+              <a:t>20.07.2023</a:t>
             </a:fld>
             <a:endParaRPr lang="de-DE" dirty="0"/>
           </a:p>
@@ -4007,7 +4007,7 @@
           <a:p>
             <a:fld id="{6F1E101A-BD3B-B542-8690-1916D72F307E}" type="datetime1">
               <a:rPr lang="de-DE" smtClean="0"/>
-              <a:t>04.07.2023</a:t>
+              <a:t>20.07.2023</a:t>
             </a:fld>
             <a:endParaRPr lang="de-DE" dirty="0"/>
           </a:p>
@@ -4218,7 +4218,7 @@
             <a:fld id="{6F1E101A-BD3B-B542-8690-1916D72F307E}" type="datetime1">
               <a:rPr lang="de-DE" smtClean="0"/>
               <a:pPr/>
-              <a:t>04.07.2023</a:t>
+              <a:t>20.07.2023</a:t>
             </a:fld>
             <a:endParaRPr lang="de-DE" dirty="0"/>
           </a:p>
@@ -4883,7 +4883,7 @@
           <a:p>
             <a:fld id="{6F1E101A-BD3B-B542-8690-1916D72F307E}" type="datetime1">
               <a:rPr lang="de-DE" smtClean="0"/>
-              <a:t>04.07.2023</a:t>
+              <a:t>20.07.2023</a:t>
             </a:fld>
             <a:endParaRPr lang="de-DE" dirty="0"/>
           </a:p>
@@ -6177,7 +6177,7 @@
             <a:fld id="{6F1E101A-BD3B-B542-8690-1916D72F307E}" type="datetime1">
               <a:rPr lang="de-DE" smtClean="0"/>
               <a:pPr/>
-              <a:t>04.07.2023</a:t>
+              <a:t>20.07.2023</a:t>
             </a:fld>
             <a:endParaRPr lang="de-DE" dirty="0"/>
           </a:p>
@@ -6450,7 +6450,7 @@
           <a:p>
             <a:fld id="{6F1E101A-BD3B-B542-8690-1916D72F307E}" type="datetime1">
               <a:rPr lang="de-DE" smtClean="0"/>
-              <a:t>04.07.2023</a:t>
+              <a:t>20.07.2023</a:t>
             </a:fld>
             <a:endParaRPr lang="de-DE" dirty="0"/>
           </a:p>
@@ -6926,7 +6926,7 @@
           <a:p>
             <a:fld id="{6F1E101A-BD3B-B542-8690-1916D72F307E}" type="datetime1">
               <a:rPr lang="de-DE" smtClean="0"/>
-              <a:t>04.07.2023</a:t>
+              <a:t>20.07.2023</a:t>
             </a:fld>
             <a:endParaRPr lang="de-DE" dirty="0"/>
           </a:p>
@@ -7431,7 +7431,7 @@
           <a:p>
             <a:fld id="{6F1E101A-BD3B-B542-8690-1916D72F307E}" type="datetime1">
               <a:rPr lang="de-DE" smtClean="0"/>
-              <a:t>04.07.2023</a:t>
+              <a:t>20.07.2023</a:t>
             </a:fld>
             <a:endParaRPr lang="de-DE" dirty="0"/>
           </a:p>
@@ -7643,7 +7643,7 @@
           <a:p>
             <a:fld id="{6F1E101A-BD3B-B542-8690-1916D72F307E}" type="datetime1">
               <a:rPr lang="de-DE" smtClean="0"/>
-              <a:t>04.07.2023</a:t>
+              <a:t>20.07.2023</a:t>
             </a:fld>
             <a:endParaRPr lang="de-DE" dirty="0"/>
           </a:p>
@@ -8000,7 +8000,7 @@
           <a:p>
             <a:fld id="{6F1E101A-BD3B-B542-8690-1916D72F307E}" type="datetime1">
               <a:rPr lang="de-DE" smtClean="0"/>
-              <a:t>04.07.2023</a:t>
+              <a:t>20.07.2023</a:t>
             </a:fld>
             <a:endParaRPr lang="de-DE" dirty="0"/>
           </a:p>
@@ -8635,7 +8635,7 @@
           <a:p>
             <a:fld id="{6F1E101A-BD3B-B542-8690-1916D72F307E}" type="datetime1">
               <a:rPr lang="de-DE" smtClean="0"/>
-              <a:t>04.07.2023</a:t>
+              <a:t>20.07.2023</a:t>
             </a:fld>
             <a:endParaRPr lang="de-DE" dirty="0"/>
           </a:p>
@@ -9155,7 +9155,7 @@
           <a:p>
             <a:fld id="{6F1E101A-BD3B-B542-8690-1916D72F307E}" type="datetime1">
               <a:rPr lang="de-DE" smtClean="0"/>
-              <a:t>04.07.2023</a:t>
+              <a:t>20.07.2023</a:t>
             </a:fld>
             <a:endParaRPr lang="de-DE" dirty="0"/>
           </a:p>
@@ -9747,7 +9747,7 @@
           <a:p>
             <a:fld id="{6F1E101A-BD3B-B542-8690-1916D72F307E}" type="datetime1">
               <a:rPr lang="de-DE" smtClean="0"/>
-              <a:t>04.07.2023</a:t>
+              <a:t>20.07.2023</a:t>
             </a:fld>
             <a:endParaRPr lang="de-DE" dirty="0"/>
           </a:p>
@@ -10319,7 +10319,7 @@
           <a:p>
             <a:fld id="{6F1E101A-BD3B-B542-8690-1916D72F307E}" type="datetime1">
               <a:rPr lang="de-DE" smtClean="0"/>
-              <a:t>04.07.2023</a:t>
+              <a:t>20.07.2023</a:t>
             </a:fld>
             <a:endParaRPr lang="de-DE" dirty="0"/>
           </a:p>
@@ -10706,7 +10706,7 @@
           <a:p>
             <a:fld id="{6F1E101A-BD3B-B542-8690-1916D72F307E}" type="datetime1">
               <a:rPr lang="de-DE" smtClean="0"/>
-              <a:t>04.07.2023</a:t>
+              <a:t>20.07.2023</a:t>
             </a:fld>
             <a:endParaRPr lang="de-DE" dirty="0"/>
           </a:p>
@@ -11474,7 +11474,7 @@
           <a:p>
             <a:fld id="{8F26348B-845F-9447-ACF0-EB8A1B8AE0E8}" type="datetime1">
               <a:rPr lang="de-DE" smtClean="0"/>
-              <a:t>04.07.2023</a:t>
+              <a:t>20.07.2023</a:t>
             </a:fld>
             <a:endParaRPr lang="de-DE" dirty="0"/>
           </a:p>
@@ -12022,7 +12022,7 @@
           <a:p>
             <a:fld id="{8F26348B-845F-9447-ACF0-EB8A1B8AE0E8}" type="datetime1">
               <a:rPr lang="de-DE" smtClean="0"/>
-              <a:t>04.07.2023</a:t>
+              <a:t>20.07.2023</a:t>
             </a:fld>
             <a:endParaRPr lang="de-DE" dirty="0"/>
           </a:p>
@@ -12124,7 +12124,7 @@
             <a:fld id="{6F1E101A-BD3B-B542-8690-1916D72F307E}" type="datetime1">
               <a:rPr lang="de-DE" smtClean="0"/>
               <a:pPr/>
-              <a:t>04.07.2023</a:t>
+              <a:t>20.07.2023</a:t>
             </a:fld>
             <a:endParaRPr lang="de-DE" dirty="0"/>
           </a:p>
@@ -12299,7 +12299,7 @@
           <a:p>
             <a:fld id="{8F26348B-845F-9447-ACF0-EB8A1B8AE0E8}" type="datetime1">
               <a:rPr lang="de-DE" smtClean="0"/>
-              <a:t>04.07.2023</a:t>
+              <a:t>20.07.2023</a:t>
             </a:fld>
             <a:endParaRPr lang="de-DE" dirty="0"/>
           </a:p>
@@ -13317,7 +13317,7 @@
           <a:p>
             <a:fld id="{8F26348B-845F-9447-ACF0-EB8A1B8AE0E8}" type="datetime1">
               <a:rPr lang="de-DE" smtClean="0"/>
-              <a:t>04.07.2023</a:t>
+              <a:t>20.07.2023</a:t>
             </a:fld>
             <a:endParaRPr lang="de-DE" dirty="0"/>
           </a:p>
@@ -14385,7 +14385,7 @@
           <a:p>
             <a:fld id="{8F26348B-845F-9447-ACF0-EB8A1B8AE0E8}" type="datetime1">
               <a:rPr lang="de-DE" smtClean="0"/>
-              <a:t>04.07.2023</a:t>
+              <a:t>20.07.2023</a:t>
             </a:fld>
             <a:endParaRPr lang="de-DE" dirty="0"/>
           </a:p>
@@ -15204,7 +15204,7 @@
           <a:p>
             <a:fld id="{8F26348B-845F-9447-ACF0-EB8A1B8AE0E8}" type="datetime1">
               <a:rPr lang="de-DE" smtClean="0"/>
-              <a:t>04.07.2023</a:t>
+              <a:t>20.07.2023</a:t>
             </a:fld>
             <a:endParaRPr lang="de-DE" dirty="0"/>
           </a:p>
@@ -15725,7 +15725,7 @@
           <a:p>
             <a:fld id="{6F1E101A-BD3B-B542-8690-1916D72F307E}" type="datetime1">
               <a:rPr lang="de-DE" smtClean="0"/>
-              <a:t>04.07.2023</a:t>
+              <a:t>20.07.2023</a:t>
             </a:fld>
             <a:endParaRPr lang="de-DE" dirty="0"/>
           </a:p>
@@ -15983,7 +15983,7 @@
           <a:p>
             <a:fld id="{6F1E101A-BD3B-B542-8690-1916D72F307E}" type="datetime1">
               <a:rPr lang="de-DE" smtClean="0"/>
-              <a:t>04.07.2023</a:t>
+              <a:t>20.07.2023</a:t>
             </a:fld>
             <a:endParaRPr lang="de-DE" dirty="0"/>
           </a:p>
@@ -16679,7 +16679,7 @@
           <a:p>
             <a:fld id="{6F1E101A-BD3B-B542-8690-1916D72F307E}" type="datetime1">
               <a:rPr lang="de-DE" smtClean="0"/>
-              <a:t>04.07.2023</a:t>
+              <a:t>20.07.2023</a:t>
             </a:fld>
             <a:endParaRPr lang="de-DE" dirty="0"/>
           </a:p>

</xml_diff>